<commit_message>
Updated ppt with more sub task details
</commit_message>
<xml_diff>
--- a/Stock_market_dasboard_plan.pptx
+++ b/Stock_market_dasboard_plan.pptx
@@ -3545,15 +3545,15 @@
                   <a:schemeClr val="tx2"/>
                 </a:solidFill>
               </a:rPr>
-              <a:t> Create an interactive dashboard using html, JavaScript, </a:t>
+              <a:t> Create an interactive dashboard using html</a:t>
             </a:r>
             <a:r>
-              <a:rPr lang="en-US" sz="1800" dirty="0" err="1">
+              <a:rPr lang="en-US" sz="1800">
                 <a:solidFill>
                   <a:schemeClr val="tx2"/>
                 </a:solidFill>
               </a:rPr>
-              <a:t>css</a:t>
+              <a:t>, JavaScript and </a:t>
             </a:r>
             <a:r>
               <a:rPr lang="en-US" sz="1800" dirty="0">
@@ -3561,7 +3561,7 @@
                   <a:schemeClr val="tx2"/>
                 </a:solidFill>
               </a:rPr>
-              <a:t> and using external public APIs (through </a:t>
+              <a:t>using external public APIs (through </a:t>
             </a:r>
             <a:r>
               <a:rPr lang="en-US" sz="1800" dirty="0" err="1">
@@ -8100,14 +8100,14 @@
           <p:nvPr>
             <p:extLst>
               <p:ext uri="{D42A27DB-BD31-4B8C-83A1-F6EECF244321}">
-                <p14:modId xmlns:p14="http://schemas.microsoft.com/office/powerpoint/2010/main" val="3605579446"/>
+                <p14:modId xmlns:p14="http://schemas.microsoft.com/office/powerpoint/2010/main" val="2866561665"/>
               </p:ext>
             </p:extLst>
           </p:nvPr>
         </p:nvGraphicFramePr>
         <p:xfrm>
           <a:off x="1154811" y="940880"/>
-          <a:ext cx="9882377" cy="4841729"/>
+          <a:ext cx="9882377" cy="4852901"/>
         </p:xfrm>
         <a:graphic>
           <a:graphicData uri="http://schemas.openxmlformats.org/drawingml/2006/table">
@@ -8765,18 +8765,24 @@
                     <a:p>
                       <a:pPr algn="l" rtl="0" fontAlgn="t"/>
                       <a:r>
-                        <a:rPr lang="en-US" sz="1200" u="none" strike="noStrike">
+                        <a:rPr lang="en-US" sz="1200" u="none" strike="noStrike" dirty="0">
                           <a:effectLst/>
                         </a:rPr>
                         <a:t>Prepare a prototype of the project</a:t>
                       </a:r>
-                      <a:endParaRPr lang="en-US" sz="1200" b="0" i="0" u="none" strike="noStrike">
-                        <a:solidFill>
-                          <a:srgbClr val="000000"/>
-                        </a:solidFill>
-                        <a:effectLst/>
-                        <a:latin typeface="Aptos" panose="020B0004020202020204" pitchFamily="34" charset="0"/>
-                      </a:endParaRPr>
+                    </a:p>
+                    <a:p>
+                      <a:pPr algn="l" rtl="0" fontAlgn="t"/>
+                      <a:r>
+                        <a:rPr lang="en-US" sz="1200" b="0" i="0" u="none" strike="noStrike">
+                          <a:solidFill>
+                            <a:srgbClr val="000000"/>
+                          </a:solidFill>
+                          <a:effectLst/>
+                          <a:latin typeface="Aptos" panose="020B0004020202020204" pitchFamily="34" charset="0"/>
+                        </a:rPr>
+                        <a:t>Update Readme file</a:t>
+                      </a:r>
                     </a:p>
                   </a:txBody>
                   <a:tcPr marL="7620" marR="7620" marT="7620" marB="0"/>

</xml_diff>